<commit_message>
Almost working, need to relax boundaries
</commit_message>
<xml_diff>
--- a/working/invitroTKstats.pptx
+++ b/working/invitroTKstats.pptx
@@ -13,6 +13,7 @@
     <p:sldId id="262" r:id="rId7"/>
     <p:sldId id="263" r:id="rId8"/>
     <p:sldId id="264" r:id="rId9"/>
+    <p:sldId id="265" r:id="rId10"/>
   </p:sldIdLst>
   <p:sldSz cx="12192000" cy="6858000"/>
   <p:notesSz cx="6858000" cy="9144000"/>
@@ -111,6 +112,11 @@
       </a:defRPr>
     </a:lvl9pPr>
   </p:defaultTextStyle>
+  <p:extLst>
+    <p:ext uri="{EFAFB233-063F-42B5-8137-9DF3F51BA10A}">
+      <p15:sldGuideLst xmlns:p15="http://schemas.microsoft.com/office/powerpoint/2012/main"/>
+    </p:ext>
+  </p:extLst>
 </p:presentation>
 </file>
 
@@ -9467,7 +9473,7 @@
             <a:graphicData uri="http://schemas.openxmlformats.org/presentationml/2006/ole">
               <mc:AlternateContent xmlns:mc="http://schemas.openxmlformats.org/markup-compatibility/2006">
                 <mc:Choice xmlns:v="urn:schemas-microsoft-com:vml" Requires="v">
-                  <p:oleObj spid="_x0000_s1030" name="Equation" r:id="rId6" imgW="825480" imgH="431640" progId="Equation.3">
+                  <p:oleObj spid="_x0000_s1033" name="Equation" r:id="rId6" imgW="825480" imgH="431640" progId="Equation.3">
                     <p:embed/>
                   </p:oleObj>
                 </mc:Choice>
@@ -16824,6 +16830,264 @@
 </p:sld>
 </file>
 
+<file path=ppt/slides/slide9.xml><?xml version="1.0" encoding="utf-8"?>
+<p:sld xmlns:a="http://schemas.openxmlformats.org/drawingml/2006/main" xmlns:r="http://schemas.openxmlformats.org/officeDocument/2006/relationships" xmlns:p="http://schemas.openxmlformats.org/presentationml/2006/main">
+  <p:cSld>
+    <p:spTree>
+      <p:nvGrpSpPr>
+        <p:cNvPr id="1" name=""/>
+        <p:cNvGrpSpPr/>
+        <p:nvPr/>
+      </p:nvGrpSpPr>
+      <p:grpSpPr>
+        <a:xfrm>
+          <a:off x="0" y="0"/>
+          <a:ext cx="0" cy="0"/>
+          <a:chOff x="0" y="0"/>
+          <a:chExt cx="0" cy="0"/>
+        </a:xfrm>
+      </p:grpSpPr>
+      <p:sp>
+        <p:nvSpPr>
+          <p:cNvPr id="2" name="Title 1">
+            <a:extLst>
+              <a:ext uri="{FF2B5EF4-FFF2-40B4-BE49-F238E27FC236}">
+                <a16:creationId xmlns:a16="http://schemas.microsoft.com/office/drawing/2014/main" id="{EECB8BF6-907D-438C-B95E-C32C4DE6BEAC}"/>
+              </a:ext>
+            </a:extLst>
+          </p:cNvPr>
+          <p:cNvSpPr txBox="1">
+            <a:spLocks/>
+          </p:cNvSpPr>
+          <p:nvPr/>
+        </p:nvSpPr>
+        <p:spPr>
+          <a:xfrm>
+            <a:off x="838200" y="365125"/>
+            <a:ext cx="10858500" cy="1325563"/>
+          </a:xfrm>
+          <a:prstGeom prst="rect">
+            <a:avLst/>
+          </a:prstGeom>
+        </p:spPr>
+        <p:txBody>
+          <a:bodyPr/>
+          <a:lstStyle>
+            <a:lvl1pPr algn="l" defTabSz="914400" rtl="0" eaLnBrk="1" latinLnBrk="0" hangingPunct="1">
+              <a:lnSpc>
+                <a:spcPct val="90000"/>
+              </a:lnSpc>
+              <a:spcBef>
+                <a:spcPct val="0"/>
+              </a:spcBef>
+              <a:buNone/>
+              <a:defRPr sz="4400" kern="1200">
+                <a:solidFill>
+                  <a:schemeClr val="tx1"/>
+                </a:solidFill>
+                <a:latin typeface="+mj-lt"/>
+                <a:ea typeface="+mj-ea"/>
+                <a:cs typeface="+mj-cs"/>
+              </a:defRPr>
+            </a:lvl1pPr>
+          </a:lstStyle>
+          <a:p>
+            <a:r>
+              <a:rPr lang="en-US" dirty="0"/>
+              <a:t>Bayesian Framework</a:t>
+            </a:r>
+          </a:p>
+        </p:txBody>
+      </p:sp>
+      <p:sp>
+        <p:nvSpPr>
+          <p:cNvPr id="3" name="TextBox 2">
+            <a:extLst>
+              <a:ext uri="{FF2B5EF4-FFF2-40B4-BE49-F238E27FC236}">
+                <a16:creationId xmlns:a16="http://schemas.microsoft.com/office/drawing/2014/main" id="{84DA0B7E-EAB2-4BFF-A0FE-65F8AB2DAAEC}"/>
+              </a:ext>
+            </a:extLst>
+          </p:cNvPr>
+          <p:cNvSpPr txBox="1"/>
+          <p:nvPr/>
+        </p:nvSpPr>
+        <p:spPr>
+          <a:xfrm>
+            <a:off x="272180" y="1027906"/>
+            <a:ext cx="11647639" cy="5632311"/>
+          </a:xfrm>
+          <a:prstGeom prst="rect">
+            <a:avLst/>
+          </a:prstGeom>
+          <a:noFill/>
+        </p:spPr>
+        <p:txBody>
+          <a:bodyPr wrap="square" rtlCol="0">
+            <a:spAutoFit/>
+          </a:bodyPr>
+          <a:lstStyle/>
+          <a:p>
+            <a:pPr marL="285750" indent="-285750">
+              <a:buFont typeface="Arial" panose="020B0604020202020204" pitchFamily="34" charset="0"/>
+              <a:buChar char="•"/>
+            </a:pPr>
+            <a:r>
+              <a:rPr lang="en-US" dirty="0"/>
+              <a:t>Two Models:</a:t>
+            </a:r>
+          </a:p>
+          <a:p>
+            <a:pPr marL="285750" indent="-285750">
+              <a:buFont typeface="Arial" panose="020B0604020202020204" pitchFamily="34" charset="0"/>
+              <a:buChar char="•"/>
+            </a:pPr>
+            <a:endParaRPr lang="en-US" dirty="0"/>
+          </a:p>
+          <a:p>
+            <a:pPr marL="742950" lvl="1" indent="-285750">
+              <a:buFont typeface="Arial" panose="020B0604020202020204" pitchFamily="34" charset="0"/>
+              <a:buChar char="•"/>
+            </a:pPr>
+            <a:r>
+              <a:rPr lang="en-US" dirty="0"/>
+              <a:t>First model is for analytical chemistry – uses information on blanks, any calibration curve, and variability of observations to estimate the relationship between chemical concentration and mass spectrometry peak area</a:t>
+            </a:r>
+          </a:p>
+          <a:p>
+            <a:pPr marL="285750" indent="-285750">
+              <a:buFont typeface="Arial" panose="020B0604020202020204" pitchFamily="34" charset="0"/>
+              <a:buChar char="•"/>
+            </a:pPr>
+            <a:endParaRPr lang="en-US" dirty="0"/>
+          </a:p>
+          <a:p>
+            <a:pPr marL="742950" lvl="1" indent="-285750">
+              <a:buFont typeface="Arial" panose="020B0604020202020204" pitchFamily="34" charset="0"/>
+              <a:buChar char="•"/>
+            </a:pPr>
+            <a:r>
+              <a:rPr lang="en-US" dirty="0"/>
+              <a:t>Second model is for the in vitro toxicokinetic measurement process</a:t>
+            </a:r>
+          </a:p>
+          <a:p>
+            <a:pPr marL="285750" indent="-285750">
+              <a:buFont typeface="Arial" panose="020B0604020202020204" pitchFamily="34" charset="0"/>
+              <a:buChar char="•"/>
+            </a:pPr>
+            <a:endParaRPr lang="en-US" dirty="0"/>
+          </a:p>
+          <a:p>
+            <a:pPr marL="285750" indent="-285750">
+              <a:buFont typeface="Arial" panose="020B0604020202020204" pitchFamily="34" charset="0"/>
+              <a:buChar char="•"/>
+            </a:pPr>
+            <a:r>
+              <a:rPr lang="en-US" dirty="0"/>
+              <a:t>All observations used contribute to an estimate of a distribution of plausible parameter values for both models. </a:t>
+            </a:r>
+          </a:p>
+          <a:p>
+            <a:pPr marL="285750" indent="-285750">
+              <a:buFont typeface="Arial" panose="020B0604020202020204" pitchFamily="34" charset="0"/>
+              <a:buChar char="•"/>
+            </a:pPr>
+            <a:endParaRPr lang="en-US" dirty="0"/>
+          </a:p>
+          <a:p>
+            <a:pPr marL="285750" indent="-285750">
+              <a:buFont typeface="Arial" panose="020B0604020202020204" pitchFamily="34" charset="0"/>
+              <a:buChar char="•"/>
+            </a:pPr>
+            <a:r>
+              <a:rPr lang="en-US" dirty="0"/>
+              <a:t>The range of these distributions reflect the estimated uncertainty</a:t>
+            </a:r>
+          </a:p>
+          <a:p>
+            <a:pPr marL="285750" indent="-285750">
+              <a:buFont typeface="Arial" panose="020B0604020202020204" pitchFamily="34" charset="0"/>
+              <a:buChar char="•"/>
+            </a:pPr>
+            <a:endParaRPr lang="en-US" dirty="0"/>
+          </a:p>
+          <a:p>
+            <a:pPr marL="285750" indent="-285750">
+              <a:buFont typeface="Arial" panose="020B0604020202020204" pitchFamily="34" charset="0"/>
+              <a:buChar char="•"/>
+            </a:pPr>
+            <a:r>
+              <a:rPr lang="en-US" dirty="0"/>
+              <a:t>We use Markov Chain Monte Carlo (MCMC) to estimate the sets of plausible parameters – this introduces an element of randomness but we use random number generator seeds to create reproducible pseudorandom sequences</a:t>
+            </a:r>
+          </a:p>
+          <a:p>
+            <a:pPr marL="285750" indent="-285750">
+              <a:buFont typeface="Arial" panose="020B0604020202020204" pitchFamily="34" charset="0"/>
+              <a:buChar char="•"/>
+            </a:pPr>
+            <a:endParaRPr lang="en-US" dirty="0"/>
+          </a:p>
+          <a:p>
+            <a:pPr marL="285750" indent="-285750">
+              <a:buFont typeface="Arial" panose="020B0604020202020204" pitchFamily="34" charset="0"/>
+              <a:buChar char="•"/>
+            </a:pPr>
+            <a:r>
+              <a:rPr lang="en-US" dirty="0"/>
+              <a:t>The Bayesian estimates can take several minutes to perform and are prone to crashing because of unfortunate parameter combinations – for this reason the functions for Bayesian analysis can be restarted at the chemical where they crashed</a:t>
+            </a:r>
+          </a:p>
+          <a:p>
+            <a:pPr marL="742950" lvl="1" indent="-285750">
+              <a:buFont typeface="Arial" panose="020B0604020202020204" pitchFamily="34" charset="0"/>
+              <a:buChar char="•"/>
+            </a:pPr>
+            <a:r>
+              <a:rPr lang="en-US" dirty="0"/>
+              <a:t>Delete the </a:t>
+            </a:r>
+            <a:r>
+              <a:rPr lang="en-US"/>
+              <a:t>Level4 file if </a:t>
+            </a:r>
+            <a:r>
+              <a:rPr lang="en-US" dirty="0"/>
+              <a:t>this behavior is not desired</a:t>
+            </a:r>
+          </a:p>
+          <a:p>
+            <a:pPr marL="285750" indent="-285750">
+              <a:buFont typeface="Arial" panose="020B0604020202020204" pitchFamily="34" charset="0"/>
+              <a:buChar char="•"/>
+            </a:pPr>
+            <a:endParaRPr lang="en-US" dirty="0"/>
+          </a:p>
+          <a:p>
+            <a:pPr marL="285750" indent="-285750">
+              <a:buFont typeface="Arial" panose="020B0604020202020204" pitchFamily="34" charset="0"/>
+              <a:buChar char="•"/>
+            </a:pPr>
+            <a:r>
+              <a:rPr lang="en-US" dirty="0"/>
+              <a:t>The MCMC process uses multiple “chains” which can be run in parallel if multiple computer cores are available</a:t>
+            </a:r>
+          </a:p>
+        </p:txBody>
+      </p:sp>
+    </p:spTree>
+    <p:extLst>
+      <p:ext uri="{BB962C8B-B14F-4D97-AF65-F5344CB8AC3E}">
+        <p14:creationId xmlns:p14="http://schemas.microsoft.com/office/powerpoint/2010/main" val="221233021"/>
+      </p:ext>
+    </p:extLst>
+  </p:cSld>
+  <p:clrMapOvr>
+    <a:masterClrMapping/>
+  </p:clrMapOvr>
+</p:sld>
+</file>
+
 <file path=ppt/theme/theme1.xml><?xml version="1.0" encoding="utf-8"?>
 <a:theme xmlns:a="http://schemas.openxmlformats.org/drawingml/2006/main" name="Office Theme">
   <a:themeElements>

</xml_diff>